<commit_message>
Tessa updates. need to finish slide for kaggle data
</commit_message>
<xml_diff>
--- a/Week7Progress.pptx
+++ b/Week7Progress.pptx
@@ -7,6 +7,14 @@
   <p:sldIdLst>
     <p:sldId id="256" r:id="rId2"/>
     <p:sldId id="257" r:id="rId3"/>
+    <p:sldId id="258" r:id="rId4"/>
+    <p:sldId id="260" r:id="rId5"/>
+    <p:sldId id="261" r:id="rId6"/>
+    <p:sldId id="262" r:id="rId7"/>
+    <p:sldId id="263" r:id="rId8"/>
+    <p:sldId id="264" r:id="rId9"/>
+    <p:sldId id="265" r:id="rId10"/>
+    <p:sldId id="259" r:id="rId11"/>
   </p:sldIdLst>
   <p:sldSz cx="12192000" cy="6858000"/>
   <p:notesSz cx="6858000" cy="9144000"/>
@@ -105,6 +113,11 @@
       </a:defRPr>
     </a:lvl9pPr>
   </p:defaultTextStyle>
+  <p:extLst>
+    <p:ext uri="{EFAFB233-063F-42B5-8137-9DF3F51BA10A}">
+      <p15:sldGuideLst xmlns:p15="http://schemas.microsoft.com/office/powerpoint/2012/main"/>
+    </p:ext>
+  </p:extLst>
 </p:presentation>
 </file>
 
@@ -271,7 +284,7 @@
           <a:p>
             <a:fld id="{1160EA64-D806-43AC-9DF2-F8C432F32B4C}" type="datetimeFigureOut">
               <a:rPr lang="en-US" dirty="0"/>
-              <a:t>5/10/21</a:t>
+              <a:t>5/11/21</a:t>
             </a:fld>
             <a:endParaRPr lang="en-US" dirty="0"/>
           </a:p>
@@ -437,7 +450,7 @@
           <a:p>
             <a:fld id="{E9F9C37B-1D36-470B-8223-D6C91242EC14}" type="datetimeFigureOut">
               <a:rPr lang="en-US" dirty="0"/>
-              <a:t>5/10/21</a:t>
+              <a:t>5/11/21</a:t>
             </a:fld>
             <a:endParaRPr lang="en-US" dirty="0"/>
           </a:p>
@@ -612,7 +625,7 @@
           <a:p>
             <a:fld id="{67C6F52A-A82B-47A2-A83A-8C4C91F2D59F}" type="datetimeFigureOut">
               <a:rPr lang="en-US" dirty="0"/>
-              <a:t>5/10/21</a:t>
+              <a:t>5/11/21</a:t>
             </a:fld>
             <a:endParaRPr lang="en-US" dirty="0"/>
           </a:p>
@@ -777,7 +790,7 @@
           <a:p>
             <a:fld id="{F070A7B3-6521-4DCA-87E5-044747A908C1}" type="datetimeFigureOut">
               <a:rPr lang="en-US" dirty="0"/>
-              <a:t>5/10/21</a:t>
+              <a:t>5/11/21</a:t>
             </a:fld>
             <a:endParaRPr lang="en-US" dirty="0"/>
           </a:p>
@@ -1041,7 +1054,7 @@
           <a:p>
             <a:fld id="{1160EA64-D806-43AC-9DF2-F8C432F32B4C}" type="datetimeFigureOut">
               <a:rPr lang="en-US" dirty="0"/>
-              <a:t>5/10/21</a:t>
+              <a:t>5/11/21</a:t>
             </a:fld>
             <a:endParaRPr lang="en-US" dirty="0"/>
           </a:p>
@@ -1269,7 +1282,7 @@
           <a:p>
             <a:fld id="{AB134690-1557-4C89-A502-4959FE7FAD70}" type="datetimeFigureOut">
               <a:rPr lang="en-US" dirty="0"/>
-              <a:t>5/10/21</a:t>
+              <a:t>5/11/21</a:t>
             </a:fld>
             <a:endParaRPr lang="en-US" dirty="0"/>
           </a:p>
@@ -1623,7 +1636,7 @@
           <a:p>
             <a:fld id="{4F7D4976-E339-4826-83B7-FBD03F55ECF8}" type="datetimeFigureOut">
               <a:rPr lang="en-US" dirty="0"/>
-              <a:t>5/10/21</a:t>
+              <a:t>5/11/21</a:t>
             </a:fld>
             <a:endParaRPr lang="en-US" dirty="0"/>
           </a:p>
@@ -1759,7 +1772,7 @@
           <a:p>
             <a:fld id="{E1037C31-9E7A-4F99-8774-A0E530DE1A42}" type="datetimeFigureOut">
               <a:rPr lang="en-US" dirty="0"/>
-              <a:t>5/10/21</a:t>
+              <a:t>5/11/21</a:t>
             </a:fld>
             <a:endParaRPr lang="en-US" dirty="0"/>
           </a:p>
@@ -1849,7 +1862,7 @@
           <a:p>
             <a:fld id="{C278504F-A551-4DE0-9316-4DCD1D8CC752}" type="datetimeFigureOut">
               <a:rPr lang="en-US" dirty="0"/>
-              <a:t>5/10/21</a:t>
+              <a:t>5/11/21</a:t>
             </a:fld>
             <a:endParaRPr lang="en-US" dirty="0"/>
           </a:p>
@@ -2201,7 +2214,7 @@
           <a:p>
             <a:fld id="{D1BE4249-C0D0-4B06-8692-E8BB871AF643}" type="datetimeFigureOut">
               <a:rPr lang="en-US" dirty="0"/>
-              <a:t>5/10/21</a:t>
+              <a:t>5/11/21</a:t>
             </a:fld>
             <a:endParaRPr lang="en-US" dirty="0"/>
           </a:p>
@@ -2553,7 +2566,7 @@
           <a:p>
             <a:fld id="{042B0DB6-F5C7-45FB-8CF3-31B45F9C2DAC}" type="datetimeFigureOut">
               <a:rPr lang="en-US" dirty="0"/>
-              <a:t>5/10/21</a:t>
+              <a:t>5/11/21</a:t>
             </a:fld>
             <a:endParaRPr lang="en-US" dirty="0"/>
           </a:p>
@@ -2790,7 +2803,7 @@
           <a:p>
             <a:fld id="{1160EA64-D806-43AC-9DF2-F8C432F32B4C}" type="datetimeFigureOut">
               <a:rPr lang="en-US" dirty="0"/>
-              <a:t>5/10/21</a:t>
+              <a:t>5/11/21</a:t>
             </a:fld>
             <a:endParaRPr lang="en-US" dirty="0"/>
           </a:p>
@@ -3322,6 +3335,146 @@
 </p:sld>
 </file>
 
+<file path=ppt/slides/slide10.xml><?xml version="1.0" encoding="utf-8"?>
+<p:sld xmlns:a="http://schemas.openxmlformats.org/drawingml/2006/main" xmlns:r="http://schemas.openxmlformats.org/officeDocument/2006/relationships" xmlns:p="http://schemas.openxmlformats.org/presentationml/2006/main">
+  <p:cSld>
+    <p:spTree>
+      <p:nvGrpSpPr>
+        <p:cNvPr id="1" name=""/>
+        <p:cNvGrpSpPr/>
+        <p:nvPr/>
+      </p:nvGrpSpPr>
+      <p:grpSpPr>
+        <a:xfrm>
+          <a:off x="0" y="0"/>
+          <a:ext cx="0" cy="0"/>
+          <a:chOff x="0" y="0"/>
+          <a:chExt cx="0" cy="0"/>
+        </a:xfrm>
+      </p:grpSpPr>
+      <p:sp>
+        <p:nvSpPr>
+          <p:cNvPr id="2" name="Title 1">
+            <a:extLst>
+              <a:ext uri="{FF2B5EF4-FFF2-40B4-BE49-F238E27FC236}">
+                <a16:creationId xmlns:a16="http://schemas.microsoft.com/office/drawing/2014/main" id="{1DD5D11F-0F65-0D44-967A-BCC67B640311}"/>
+              </a:ext>
+            </a:extLst>
+          </p:cNvPr>
+          <p:cNvSpPr>
+            <a:spLocks noGrp="1"/>
+          </p:cNvSpPr>
+          <p:nvPr>
+            <p:ph type="title"/>
+          </p:nvPr>
+        </p:nvSpPr>
+        <p:spPr/>
+        <p:txBody>
+          <a:bodyPr/>
+          <a:lstStyle/>
+          <a:p>
+            <a:r>
+              <a:rPr lang="en-US" dirty="0"/>
+              <a:t>Kaggle book data updates</a:t>
+            </a:r>
+          </a:p>
+        </p:txBody>
+      </p:sp>
+      <p:sp>
+        <p:nvSpPr>
+          <p:cNvPr id="3" name="Content Placeholder 2">
+            <a:extLst>
+              <a:ext uri="{FF2B5EF4-FFF2-40B4-BE49-F238E27FC236}">
+                <a16:creationId xmlns:a16="http://schemas.microsoft.com/office/drawing/2014/main" id="{8102DC69-12BD-8142-B732-66698D2085F1}"/>
+              </a:ext>
+            </a:extLst>
+          </p:cNvPr>
+          <p:cNvSpPr>
+            <a:spLocks noGrp="1"/>
+          </p:cNvSpPr>
+          <p:nvPr>
+            <p:ph idx="1"/>
+          </p:nvPr>
+        </p:nvSpPr>
+        <p:spPr/>
+        <p:txBody>
+          <a:bodyPr>
+            <a:normAutofit fontScale="85000" lnSpcReduction="10000"/>
+          </a:bodyPr>
+          <a:lstStyle/>
+          <a:p>
+            <a:r>
+              <a:rPr lang="en-US" dirty="0"/>
+              <a:t>Successfully pulled it into pandas</a:t>
+            </a:r>
+          </a:p>
+          <a:p>
+            <a:r>
+              <a:rPr lang="en-US" dirty="0"/>
+              <a:t>Show number of reviews per year</a:t>
+            </a:r>
+          </a:p>
+          <a:p>
+            <a:r>
+              <a:rPr lang="en-US" dirty="0"/>
+              <a:t>We can match on book title but currently need to do a better merge than just left join since we care about the year </a:t>
+            </a:r>
+          </a:p>
+          <a:p>
+            <a:pPr lvl="1"/>
+            <a:r>
+              <a:rPr lang="en-US" dirty="0"/>
+              <a:t>Have not fully implemented this yet</a:t>
+            </a:r>
+          </a:p>
+          <a:p>
+            <a:pPr lvl="1"/>
+            <a:r>
+              <a:rPr lang="en-US" dirty="0"/>
+              <a:t>Make a second version of the book review data where we keep just the first 30 reviews of each book since we want to know long term if we can predict if a book will make the top 100 by its initial review </a:t>
+            </a:r>
+          </a:p>
+          <a:p>
+            <a:pPr lvl="1"/>
+            <a:r>
+              <a:rPr lang="en-US" dirty="0"/>
+              <a:t>Title, first review date, 30</a:t>
+            </a:r>
+            <a:r>
+              <a:rPr lang="en-US" baseline="30000" dirty="0"/>
+              <a:t>th</a:t>
+            </a:r>
+            <a:r>
+              <a:rPr lang="en-US" dirty="0"/>
+              <a:t> review date, all 30 reviews, top 100 yes or no (one line of new dataset) </a:t>
+            </a:r>
+          </a:p>
+          <a:p>
+            <a:pPr lvl="2"/>
+            <a:r>
+              <a:rPr lang="en-US" dirty="0"/>
+              <a:t>Might not need to do a merge if we do it this way. Just check each title if it is in corresponding top 100 list or not </a:t>
+            </a:r>
+          </a:p>
+          <a:p>
+            <a:pPr lvl="1"/>
+            <a:endParaRPr lang="en-US" dirty="0"/>
+          </a:p>
+        </p:txBody>
+      </p:sp>
+    </p:spTree>
+    <p:extLst>
+      <p:ext uri="{BB962C8B-B14F-4D97-AF65-F5344CB8AC3E}">
+        <p14:creationId xmlns:p14="http://schemas.microsoft.com/office/powerpoint/2010/main" val="1776058400"/>
+      </p:ext>
+    </p:extLst>
+  </p:cSld>
+  <p:clrMapOvr>
+    <a:masterClrMapping/>
+  </p:clrMapOvr>
+</p:sld>
+</file>
+
 <file path=ppt/slides/slide2.xml><?xml version="1.0" encoding="utf-8"?>
 <p:sld xmlns:a="http://schemas.openxmlformats.org/drawingml/2006/main" xmlns:r="http://schemas.openxmlformats.org/officeDocument/2006/relationships" xmlns:p="http://schemas.openxmlformats.org/presentationml/2006/main">
   <p:cSld>
@@ -3400,6 +3553,988 @@
     <p:extLst>
       <p:ext uri="{BB962C8B-B14F-4D97-AF65-F5344CB8AC3E}">
         <p14:creationId xmlns:p14="http://schemas.microsoft.com/office/powerpoint/2010/main" val="3072579964"/>
+      </p:ext>
+    </p:extLst>
+  </p:cSld>
+  <p:clrMapOvr>
+    <a:masterClrMapping/>
+  </p:clrMapOvr>
+</p:sld>
+</file>
+
+<file path=ppt/slides/slide3.xml><?xml version="1.0" encoding="utf-8"?>
+<p:sld xmlns:a="http://schemas.openxmlformats.org/drawingml/2006/main" xmlns:r="http://schemas.openxmlformats.org/officeDocument/2006/relationships" xmlns:p="http://schemas.openxmlformats.org/presentationml/2006/main">
+  <p:cSld>
+    <p:spTree>
+      <p:nvGrpSpPr>
+        <p:cNvPr id="1" name=""/>
+        <p:cNvGrpSpPr/>
+        <p:nvPr/>
+      </p:nvGrpSpPr>
+      <p:grpSpPr>
+        <a:xfrm>
+          <a:off x="0" y="0"/>
+          <a:ext cx="0" cy="0"/>
+          <a:chOff x="0" y="0"/>
+          <a:chExt cx="0" cy="0"/>
+        </a:xfrm>
+      </p:grpSpPr>
+      <p:sp>
+        <p:nvSpPr>
+          <p:cNvPr id="2" name="Title 1">
+            <a:extLst>
+              <a:ext uri="{FF2B5EF4-FFF2-40B4-BE49-F238E27FC236}">
+                <a16:creationId xmlns:a16="http://schemas.microsoft.com/office/drawing/2014/main" id="{DC25E9F9-F54B-AA42-A30B-FB389905CABC}"/>
+              </a:ext>
+            </a:extLst>
+          </p:cNvPr>
+          <p:cNvSpPr>
+            <a:spLocks noGrp="1"/>
+          </p:cNvSpPr>
+          <p:nvPr>
+            <p:ph type="title"/>
+          </p:nvPr>
+        </p:nvSpPr>
+        <p:spPr/>
+        <p:txBody>
+          <a:bodyPr/>
+          <a:lstStyle/>
+          <a:p>
+            <a:r>
+              <a:rPr lang="en-US" dirty="0"/>
+              <a:t>Book data updates</a:t>
+            </a:r>
+          </a:p>
+        </p:txBody>
+      </p:sp>
+      <p:sp>
+        <p:nvSpPr>
+          <p:cNvPr id="3" name="Content Placeholder 2">
+            <a:extLst>
+              <a:ext uri="{FF2B5EF4-FFF2-40B4-BE49-F238E27FC236}">
+                <a16:creationId xmlns:a16="http://schemas.microsoft.com/office/drawing/2014/main" id="{DD35B7DF-657A-164D-860A-28C278C838E5}"/>
+              </a:ext>
+            </a:extLst>
+          </p:cNvPr>
+          <p:cNvSpPr>
+            <a:spLocks noGrp="1"/>
+          </p:cNvSpPr>
+          <p:nvPr>
+            <p:ph idx="1"/>
+          </p:nvPr>
+        </p:nvSpPr>
+        <p:spPr>
+          <a:xfrm>
+            <a:off x="2231136" y="2406550"/>
+            <a:ext cx="7729728" cy="3101983"/>
+          </a:xfrm>
+        </p:spPr>
+        <p:txBody>
+          <a:bodyPr>
+            <a:normAutofit fontScale="92500" lnSpcReduction="10000"/>
+          </a:bodyPr>
+          <a:lstStyle/>
+          <a:p>
+            <a:r>
+              <a:rPr lang="en-US" dirty="0"/>
+              <a:t>Wrote three Python files to clean the Amazon book review data</a:t>
+            </a:r>
+          </a:p>
+          <a:p>
+            <a:pPr lvl="0"/>
+            <a:r>
+              <a:rPr lang="en-US" dirty="0"/>
+              <a:t>Original file from Amazon contained 10,319,090 reviews. It was 6.7GB. </a:t>
+            </a:r>
+          </a:p>
+          <a:p>
+            <a:r>
+              <a:rPr lang="en-US" dirty="0"/>
+              <a:t>After first pass: 7,450,412 reviews, 2.66GB.</a:t>
+            </a:r>
+          </a:p>
+          <a:p>
+            <a:pPr lvl="1"/>
+            <a:r>
+              <a:rPr lang="en-US" dirty="0"/>
+              <a:t>Most common issue was not verified purchases.</a:t>
+            </a:r>
+          </a:p>
+          <a:p>
+            <a:r>
+              <a:rPr lang="en-US" dirty="0"/>
+              <a:t>Performed second pass to count number of reviews per book </a:t>
+            </a:r>
+          </a:p>
+          <a:p>
+            <a:pPr lvl="1"/>
+            <a:r>
+              <a:rPr lang="en-US" dirty="0"/>
+              <a:t>Once with every book: 1.65 million books</a:t>
+            </a:r>
+          </a:p>
+          <a:p>
+            <a:pPr lvl="1"/>
+            <a:r>
+              <a:rPr lang="en-US" dirty="0"/>
+              <a:t>Once with only books that contain 30 reviews or more: 34,194 books</a:t>
+            </a:r>
+          </a:p>
+          <a:p>
+            <a:r>
+              <a:rPr lang="en-US" dirty="0"/>
+              <a:t>Third pass created file of cleaned reviews containing book titles with at least 30 reviews: 2,668,988 reviews, 893 MB</a:t>
+            </a:r>
+          </a:p>
+          <a:p>
+            <a:endParaRPr lang="en-US" dirty="0"/>
+          </a:p>
+        </p:txBody>
+      </p:sp>
+    </p:spTree>
+    <p:extLst>
+      <p:ext uri="{BB962C8B-B14F-4D97-AF65-F5344CB8AC3E}">
+        <p14:creationId xmlns:p14="http://schemas.microsoft.com/office/powerpoint/2010/main" val="1418127178"/>
+      </p:ext>
+    </p:extLst>
+  </p:cSld>
+  <p:clrMapOvr>
+    <a:masterClrMapping/>
+  </p:clrMapOvr>
+</p:sld>
+</file>
+
+<file path=ppt/slides/slide4.xml><?xml version="1.0" encoding="utf-8"?>
+<p:sld xmlns:a="http://schemas.openxmlformats.org/drawingml/2006/main" xmlns:r="http://schemas.openxmlformats.org/officeDocument/2006/relationships" xmlns:p="http://schemas.openxmlformats.org/presentationml/2006/main">
+  <p:cSld>
+    <p:spTree>
+      <p:nvGrpSpPr>
+        <p:cNvPr id="1" name=""/>
+        <p:cNvGrpSpPr/>
+        <p:nvPr/>
+      </p:nvGrpSpPr>
+      <p:grpSpPr>
+        <a:xfrm>
+          <a:off x="0" y="0"/>
+          <a:ext cx="0" cy="0"/>
+          <a:chOff x="0" y="0"/>
+          <a:chExt cx="0" cy="0"/>
+        </a:xfrm>
+      </p:grpSpPr>
+      <p:sp>
+        <p:nvSpPr>
+          <p:cNvPr id="2" name="Title 1">
+            <a:extLst>
+              <a:ext uri="{FF2B5EF4-FFF2-40B4-BE49-F238E27FC236}">
+                <a16:creationId xmlns:a16="http://schemas.microsoft.com/office/drawing/2014/main" id="{C586545D-2AA0-E644-81E6-309DB01EEF8E}"/>
+              </a:ext>
+            </a:extLst>
+          </p:cNvPr>
+          <p:cNvSpPr>
+            <a:spLocks noGrp="1"/>
+          </p:cNvSpPr>
+          <p:nvPr>
+            <p:ph type="title"/>
+          </p:nvPr>
+        </p:nvSpPr>
+        <p:spPr/>
+        <p:txBody>
+          <a:bodyPr/>
+          <a:lstStyle/>
+          <a:p>
+            <a:r>
+              <a:rPr lang="en-US" dirty="0"/>
+              <a:t>Some </a:t>
+            </a:r>
+            <a:r>
+              <a:rPr lang="en-US" dirty="0" err="1"/>
+              <a:t>sda</a:t>
+            </a:r>
+            <a:r>
+              <a:rPr lang="en-US" dirty="0"/>
+              <a:t> on Amazon </a:t>
+            </a:r>
+            <a:br>
+              <a:rPr lang="en-US" dirty="0"/>
+            </a:br>
+            <a:r>
+              <a:rPr lang="en-US" dirty="0"/>
+              <a:t>book review data</a:t>
+            </a:r>
+          </a:p>
+        </p:txBody>
+      </p:sp>
+      <p:sp>
+        <p:nvSpPr>
+          <p:cNvPr id="4" name="TextBox 3">
+            <a:extLst>
+              <a:ext uri="{FF2B5EF4-FFF2-40B4-BE49-F238E27FC236}">
+                <a16:creationId xmlns:a16="http://schemas.microsoft.com/office/drawing/2014/main" id="{090F0F7B-6DA4-284D-B87C-4D9E8749BC4A}"/>
+              </a:ext>
+            </a:extLst>
+          </p:cNvPr>
+          <p:cNvSpPr txBox="1"/>
+          <p:nvPr/>
+        </p:nvSpPr>
+        <p:spPr>
+          <a:xfrm>
+            <a:off x="3399098" y="2407534"/>
+            <a:ext cx="5393803" cy="369332"/>
+          </a:xfrm>
+          <a:prstGeom prst="rect">
+            <a:avLst/>
+          </a:prstGeom>
+          <a:noFill/>
+        </p:spPr>
+        <p:txBody>
+          <a:bodyPr wrap="square" rtlCol="0">
+            <a:spAutoFit/>
+          </a:bodyPr>
+          <a:lstStyle/>
+          <a:p>
+            <a:pPr algn="ctr"/>
+            <a:r>
+              <a:rPr lang="en-US" dirty="0"/>
+              <a:t>All Data from 2</a:t>
+            </a:r>
+            <a:r>
+              <a:rPr lang="en-US" baseline="30000" dirty="0"/>
+              <a:t>nd</a:t>
+            </a:r>
+            <a:r>
+              <a:rPr lang="en-US" dirty="0"/>
+              <a:t> Pass</a:t>
+            </a:r>
+          </a:p>
+        </p:txBody>
+      </p:sp>
+      <p:pic>
+        <p:nvPicPr>
+          <p:cNvPr id="5" name="Picture 4" descr="Table&#10;&#10;Description automatically generated">
+            <a:extLst>
+              <a:ext uri="{FF2B5EF4-FFF2-40B4-BE49-F238E27FC236}">
+                <a16:creationId xmlns:a16="http://schemas.microsoft.com/office/drawing/2014/main" id="{B89D2207-1214-D44D-BEBD-3EB64120841A}"/>
+              </a:ext>
+            </a:extLst>
+          </p:cNvPr>
+          <p:cNvPicPr/>
+          <p:nvPr/>
+        </p:nvPicPr>
+        <p:blipFill>
+          <a:blip r:embed="rId2">
+            <a:extLst>
+              <a:ext uri="{28A0092B-C50C-407E-A947-70E740481C1C}">
+                <a14:useLocalDpi xmlns:a14="http://schemas.microsoft.com/office/drawing/2010/main" val="0"/>
+              </a:ext>
+            </a:extLst>
+          </a:blip>
+          <a:stretch>
+            <a:fillRect/>
+          </a:stretch>
+        </p:blipFill>
+        <p:spPr>
+          <a:xfrm>
+            <a:off x="1342662" y="3030988"/>
+            <a:ext cx="3518221" cy="3436205"/>
+          </a:xfrm>
+          <a:prstGeom prst="rect">
+            <a:avLst/>
+          </a:prstGeom>
+        </p:spPr>
+      </p:pic>
+      <p:pic>
+        <p:nvPicPr>
+          <p:cNvPr id="6" name="Picture 5" descr="Chart, histogram&#10;&#10;Description automatically generated">
+            <a:extLst>
+              <a:ext uri="{FF2B5EF4-FFF2-40B4-BE49-F238E27FC236}">
+                <a16:creationId xmlns:a16="http://schemas.microsoft.com/office/drawing/2014/main" id="{CE7CE72F-4B45-9B49-B8BC-58B5B56572E4}"/>
+              </a:ext>
+            </a:extLst>
+          </p:cNvPr>
+          <p:cNvPicPr/>
+          <p:nvPr/>
+        </p:nvPicPr>
+        <p:blipFill>
+          <a:blip r:embed="rId3">
+            <a:extLst>
+              <a:ext uri="{28A0092B-C50C-407E-A947-70E740481C1C}">
+                <a14:useLocalDpi xmlns:a14="http://schemas.microsoft.com/office/drawing/2010/main" val="0"/>
+              </a:ext>
+            </a:extLst>
+          </a:blip>
+          <a:stretch>
+            <a:fillRect/>
+          </a:stretch>
+        </p:blipFill>
+        <p:spPr>
+          <a:xfrm>
+            <a:off x="5775768" y="2882835"/>
+            <a:ext cx="5732120" cy="3643508"/>
+          </a:xfrm>
+          <a:prstGeom prst="rect">
+            <a:avLst/>
+          </a:prstGeom>
+        </p:spPr>
+      </p:pic>
+    </p:spTree>
+    <p:extLst>
+      <p:ext uri="{BB962C8B-B14F-4D97-AF65-F5344CB8AC3E}">
+        <p14:creationId xmlns:p14="http://schemas.microsoft.com/office/powerpoint/2010/main" val="2486850360"/>
+      </p:ext>
+    </p:extLst>
+  </p:cSld>
+  <p:clrMapOvr>
+    <a:masterClrMapping/>
+  </p:clrMapOvr>
+</p:sld>
+</file>
+
+<file path=ppt/slides/slide5.xml><?xml version="1.0" encoding="utf-8"?>
+<p:sld xmlns:a="http://schemas.openxmlformats.org/drawingml/2006/main" xmlns:r="http://schemas.openxmlformats.org/officeDocument/2006/relationships" xmlns:p="http://schemas.openxmlformats.org/presentationml/2006/main">
+  <p:cSld>
+    <p:spTree>
+      <p:nvGrpSpPr>
+        <p:cNvPr id="1" name=""/>
+        <p:cNvGrpSpPr/>
+        <p:nvPr/>
+      </p:nvGrpSpPr>
+      <p:grpSpPr>
+        <a:xfrm>
+          <a:off x="0" y="0"/>
+          <a:ext cx="0" cy="0"/>
+          <a:chOff x="0" y="0"/>
+          <a:chExt cx="0" cy="0"/>
+        </a:xfrm>
+      </p:grpSpPr>
+      <p:sp>
+        <p:nvSpPr>
+          <p:cNvPr id="2" name="Title 1">
+            <a:extLst>
+              <a:ext uri="{FF2B5EF4-FFF2-40B4-BE49-F238E27FC236}">
+                <a16:creationId xmlns:a16="http://schemas.microsoft.com/office/drawing/2014/main" id="{C586545D-2AA0-E644-81E6-309DB01EEF8E}"/>
+              </a:ext>
+            </a:extLst>
+          </p:cNvPr>
+          <p:cNvSpPr>
+            <a:spLocks noGrp="1"/>
+          </p:cNvSpPr>
+          <p:nvPr>
+            <p:ph type="title"/>
+          </p:nvPr>
+        </p:nvSpPr>
+        <p:spPr/>
+        <p:txBody>
+          <a:bodyPr/>
+          <a:lstStyle/>
+          <a:p>
+            <a:r>
+              <a:rPr lang="en-US" dirty="0"/>
+              <a:t>Some </a:t>
+            </a:r>
+            <a:r>
+              <a:rPr lang="en-US" dirty="0" err="1"/>
+              <a:t>sda</a:t>
+            </a:r>
+            <a:r>
+              <a:rPr lang="en-US" dirty="0"/>
+              <a:t> on Amazon </a:t>
+            </a:r>
+            <a:br>
+              <a:rPr lang="en-US" dirty="0"/>
+            </a:br>
+            <a:r>
+              <a:rPr lang="en-US" dirty="0"/>
+              <a:t>book review data</a:t>
+            </a:r>
+          </a:p>
+        </p:txBody>
+      </p:sp>
+      <p:sp>
+        <p:nvSpPr>
+          <p:cNvPr id="4" name="TextBox 3">
+            <a:extLst>
+              <a:ext uri="{FF2B5EF4-FFF2-40B4-BE49-F238E27FC236}">
+                <a16:creationId xmlns:a16="http://schemas.microsoft.com/office/drawing/2014/main" id="{090F0F7B-6DA4-284D-B87C-4D9E8749BC4A}"/>
+              </a:ext>
+            </a:extLst>
+          </p:cNvPr>
+          <p:cNvSpPr txBox="1"/>
+          <p:nvPr/>
+        </p:nvSpPr>
+        <p:spPr>
+          <a:xfrm>
+            <a:off x="3399098" y="2407534"/>
+            <a:ext cx="5393803" cy="369332"/>
+          </a:xfrm>
+          <a:prstGeom prst="rect">
+            <a:avLst/>
+          </a:prstGeom>
+          <a:noFill/>
+        </p:spPr>
+        <p:txBody>
+          <a:bodyPr wrap="square" rtlCol="0">
+            <a:spAutoFit/>
+          </a:bodyPr>
+          <a:lstStyle/>
+          <a:p>
+            <a:pPr algn="ctr"/>
+            <a:r>
+              <a:rPr lang="en-US" dirty="0"/>
+              <a:t>At least 30 Reviews Data from 2</a:t>
+            </a:r>
+            <a:r>
+              <a:rPr lang="en-US" baseline="30000" dirty="0"/>
+              <a:t>nd</a:t>
+            </a:r>
+            <a:r>
+              <a:rPr lang="en-US" dirty="0"/>
+              <a:t> Pass</a:t>
+            </a:r>
+          </a:p>
+        </p:txBody>
+      </p:sp>
+      <p:pic>
+        <p:nvPicPr>
+          <p:cNvPr id="7" name="Picture 6" descr="Table&#10;&#10;Description automatically generated">
+            <a:extLst>
+              <a:ext uri="{FF2B5EF4-FFF2-40B4-BE49-F238E27FC236}">
+                <a16:creationId xmlns:a16="http://schemas.microsoft.com/office/drawing/2014/main" id="{EE73A2CE-6A3D-7E43-A2F2-4166BCB49706}"/>
+              </a:ext>
+            </a:extLst>
+          </p:cNvPr>
+          <p:cNvPicPr/>
+          <p:nvPr/>
+        </p:nvPicPr>
+        <p:blipFill>
+          <a:blip r:embed="rId2">
+            <a:extLst>
+              <a:ext uri="{28A0092B-C50C-407E-A947-70E740481C1C}">
+                <a14:useLocalDpi xmlns:a14="http://schemas.microsoft.com/office/drawing/2010/main" val="0"/>
+              </a:ext>
+            </a:extLst>
+          </a:blip>
+          <a:stretch>
+            <a:fillRect/>
+          </a:stretch>
+        </p:blipFill>
+        <p:spPr>
+          <a:xfrm>
+            <a:off x="1307939" y="2944442"/>
+            <a:ext cx="3268804" cy="3145156"/>
+          </a:xfrm>
+          <a:prstGeom prst="rect">
+            <a:avLst/>
+          </a:prstGeom>
+        </p:spPr>
+      </p:pic>
+      <p:pic>
+        <p:nvPicPr>
+          <p:cNvPr id="8" name="Picture 7" descr="Chart, histogram&#10;&#10;Description automatically generated">
+            <a:extLst>
+              <a:ext uri="{FF2B5EF4-FFF2-40B4-BE49-F238E27FC236}">
+                <a16:creationId xmlns:a16="http://schemas.microsoft.com/office/drawing/2014/main" id="{98F7F97B-A3AF-EE40-8EDB-262E52541A78}"/>
+              </a:ext>
+            </a:extLst>
+          </p:cNvPr>
+          <p:cNvPicPr/>
+          <p:nvPr/>
+        </p:nvPicPr>
+        <p:blipFill>
+          <a:blip r:embed="rId3" cstate="print">
+            <a:extLst>
+              <a:ext uri="{28A0092B-C50C-407E-A947-70E740481C1C}">
+                <a14:useLocalDpi xmlns:a14="http://schemas.microsoft.com/office/drawing/2010/main" val="0"/>
+              </a:ext>
+            </a:extLst>
+          </a:blip>
+          <a:stretch>
+            <a:fillRect/>
+          </a:stretch>
+        </p:blipFill>
+        <p:spPr>
+          <a:xfrm>
+            <a:off x="5765639" y="2795287"/>
+            <a:ext cx="6054524" cy="3294311"/>
+          </a:xfrm>
+          <a:prstGeom prst="rect">
+            <a:avLst/>
+          </a:prstGeom>
+        </p:spPr>
+      </p:pic>
+    </p:spTree>
+    <p:extLst>
+      <p:ext uri="{BB962C8B-B14F-4D97-AF65-F5344CB8AC3E}">
+        <p14:creationId xmlns:p14="http://schemas.microsoft.com/office/powerpoint/2010/main" val="3500827991"/>
+      </p:ext>
+    </p:extLst>
+  </p:cSld>
+  <p:clrMapOvr>
+    <a:masterClrMapping/>
+  </p:clrMapOvr>
+</p:sld>
+</file>
+
+<file path=ppt/slides/slide6.xml><?xml version="1.0" encoding="utf-8"?>
+<p:sld xmlns:a="http://schemas.openxmlformats.org/drawingml/2006/main" xmlns:r="http://schemas.openxmlformats.org/officeDocument/2006/relationships" xmlns:p="http://schemas.openxmlformats.org/presentationml/2006/main">
+  <p:cSld>
+    <p:spTree>
+      <p:nvGrpSpPr>
+        <p:cNvPr id="1" name=""/>
+        <p:cNvGrpSpPr/>
+        <p:nvPr/>
+      </p:nvGrpSpPr>
+      <p:grpSpPr>
+        <a:xfrm>
+          <a:off x="0" y="0"/>
+          <a:ext cx="0" cy="0"/>
+          <a:chOff x="0" y="0"/>
+          <a:chExt cx="0" cy="0"/>
+        </a:xfrm>
+      </p:grpSpPr>
+      <p:sp>
+        <p:nvSpPr>
+          <p:cNvPr id="2" name="Title 1">
+            <a:extLst>
+              <a:ext uri="{FF2B5EF4-FFF2-40B4-BE49-F238E27FC236}">
+                <a16:creationId xmlns:a16="http://schemas.microsoft.com/office/drawing/2014/main" id="{13E4E89D-FF81-AB4D-9731-D50065CDBA6F}"/>
+              </a:ext>
+            </a:extLst>
+          </p:cNvPr>
+          <p:cNvSpPr>
+            <a:spLocks noGrp="1"/>
+          </p:cNvSpPr>
+          <p:nvPr>
+            <p:ph type="title"/>
+          </p:nvPr>
+        </p:nvSpPr>
+        <p:spPr/>
+        <p:txBody>
+          <a:bodyPr/>
+          <a:lstStyle/>
+          <a:p>
+            <a:r>
+              <a:rPr lang="en-US" dirty="0"/>
+              <a:t>Some </a:t>
+            </a:r>
+            <a:r>
+              <a:rPr lang="en-US" dirty="0" err="1"/>
+              <a:t>sda</a:t>
+            </a:r>
+            <a:r>
+              <a:rPr lang="en-US" dirty="0"/>
+              <a:t> on amazon</a:t>
+            </a:r>
+            <a:br>
+              <a:rPr lang="en-US" dirty="0"/>
+            </a:br>
+            <a:r>
+              <a:rPr lang="en-US" dirty="0"/>
+              <a:t>book review data</a:t>
+            </a:r>
+          </a:p>
+        </p:txBody>
+      </p:sp>
+      <p:pic>
+        <p:nvPicPr>
+          <p:cNvPr id="5" name="Content Placeholder 4" descr="Table&#10;&#10;Description automatically generated">
+            <a:extLst>
+              <a:ext uri="{FF2B5EF4-FFF2-40B4-BE49-F238E27FC236}">
+                <a16:creationId xmlns:a16="http://schemas.microsoft.com/office/drawing/2014/main" id="{B51A5359-540C-FD45-83D2-61B65BDBB0B6}"/>
+              </a:ext>
+            </a:extLst>
+          </p:cNvPr>
+          <p:cNvPicPr>
+            <a:picLocks noGrp="1" noChangeAspect="1"/>
+          </p:cNvPicPr>
+          <p:nvPr>
+            <p:ph idx="1"/>
+          </p:nvPr>
+        </p:nvPicPr>
+        <p:blipFill>
+          <a:blip r:embed="rId2"/>
+          <a:stretch>
+            <a:fillRect/>
+          </a:stretch>
+        </p:blipFill>
+        <p:spPr>
+          <a:xfrm>
+            <a:off x="1882486" y="2325365"/>
+            <a:ext cx="8427028" cy="4274189"/>
+          </a:xfrm>
+        </p:spPr>
+      </p:pic>
+    </p:spTree>
+    <p:extLst>
+      <p:ext uri="{BB962C8B-B14F-4D97-AF65-F5344CB8AC3E}">
+        <p14:creationId xmlns:p14="http://schemas.microsoft.com/office/powerpoint/2010/main" val="3920113656"/>
+      </p:ext>
+    </p:extLst>
+  </p:cSld>
+  <p:clrMapOvr>
+    <a:masterClrMapping/>
+  </p:clrMapOvr>
+</p:sld>
+</file>
+
+<file path=ppt/slides/slide7.xml><?xml version="1.0" encoding="utf-8"?>
+<p:sld xmlns:a="http://schemas.openxmlformats.org/drawingml/2006/main" xmlns:r="http://schemas.openxmlformats.org/officeDocument/2006/relationships" xmlns:p="http://schemas.openxmlformats.org/presentationml/2006/main">
+  <p:cSld>
+    <p:spTree>
+      <p:nvGrpSpPr>
+        <p:cNvPr id="1" name=""/>
+        <p:cNvGrpSpPr/>
+        <p:nvPr/>
+      </p:nvGrpSpPr>
+      <p:grpSpPr>
+        <a:xfrm>
+          <a:off x="0" y="0"/>
+          <a:ext cx="0" cy="0"/>
+          <a:chOff x="0" y="0"/>
+          <a:chExt cx="0" cy="0"/>
+        </a:xfrm>
+      </p:grpSpPr>
+      <p:sp>
+        <p:nvSpPr>
+          <p:cNvPr id="2" name="Title 1">
+            <a:extLst>
+              <a:ext uri="{FF2B5EF4-FFF2-40B4-BE49-F238E27FC236}">
+                <a16:creationId xmlns:a16="http://schemas.microsoft.com/office/drawing/2014/main" id="{0CFDAACD-A7E2-AD49-B91A-AF0E775FD515}"/>
+              </a:ext>
+            </a:extLst>
+          </p:cNvPr>
+          <p:cNvSpPr>
+            <a:spLocks noGrp="1"/>
+          </p:cNvSpPr>
+          <p:nvPr>
+            <p:ph type="title"/>
+          </p:nvPr>
+        </p:nvSpPr>
+        <p:spPr/>
+        <p:txBody>
+          <a:bodyPr/>
+          <a:lstStyle/>
+          <a:p>
+            <a:r>
+              <a:rPr lang="en-US" dirty="0"/>
+              <a:t>Some </a:t>
+            </a:r>
+            <a:r>
+              <a:rPr lang="en-US" dirty="0" err="1"/>
+              <a:t>sda</a:t>
+            </a:r>
+            <a:r>
+              <a:rPr lang="en-US" dirty="0"/>
+              <a:t> on amazon</a:t>
+            </a:r>
+            <a:br>
+              <a:rPr lang="en-US" dirty="0"/>
+            </a:br>
+            <a:r>
+              <a:rPr lang="en-US" dirty="0"/>
+              <a:t>book review data</a:t>
+            </a:r>
+          </a:p>
+        </p:txBody>
+      </p:sp>
+      <p:sp>
+        <p:nvSpPr>
+          <p:cNvPr id="3" name="Content Placeholder 2">
+            <a:extLst>
+              <a:ext uri="{FF2B5EF4-FFF2-40B4-BE49-F238E27FC236}">
+                <a16:creationId xmlns:a16="http://schemas.microsoft.com/office/drawing/2014/main" id="{D0C114E7-4F89-0440-9BDA-AEE11FC68BA7}"/>
+              </a:ext>
+            </a:extLst>
+          </p:cNvPr>
+          <p:cNvSpPr>
+            <a:spLocks noGrp="1"/>
+          </p:cNvSpPr>
+          <p:nvPr>
+            <p:ph idx="1"/>
+          </p:nvPr>
+        </p:nvSpPr>
+        <p:spPr/>
+        <p:txBody>
+          <a:bodyPr/>
+          <a:lstStyle/>
+          <a:p>
+            <a:endParaRPr lang="en-US"/>
+          </a:p>
+        </p:txBody>
+      </p:sp>
+      <p:pic>
+        <p:nvPicPr>
+          <p:cNvPr id="4" name="Picture 3" descr="Graphical user interface, text, application, email&#10;&#10;Description automatically generated">
+            <a:extLst>
+              <a:ext uri="{FF2B5EF4-FFF2-40B4-BE49-F238E27FC236}">
+                <a16:creationId xmlns:a16="http://schemas.microsoft.com/office/drawing/2014/main" id="{17BEC51E-52D5-8B44-B04A-DE8739CA4A2B}"/>
+              </a:ext>
+            </a:extLst>
+          </p:cNvPr>
+          <p:cNvPicPr>
+            <a:picLocks noChangeAspect="1"/>
+          </p:cNvPicPr>
+          <p:nvPr/>
+        </p:nvPicPr>
+        <p:blipFill>
+          <a:blip r:embed="rId2"/>
+          <a:stretch>
+            <a:fillRect/>
+          </a:stretch>
+        </p:blipFill>
+        <p:spPr>
+          <a:xfrm>
+            <a:off x="1153172" y="2339602"/>
+            <a:ext cx="9885655" cy="3675436"/>
+          </a:xfrm>
+          <a:prstGeom prst="rect">
+            <a:avLst/>
+          </a:prstGeom>
+        </p:spPr>
+      </p:pic>
+    </p:spTree>
+    <p:extLst>
+      <p:ext uri="{BB962C8B-B14F-4D97-AF65-F5344CB8AC3E}">
+        <p14:creationId xmlns:p14="http://schemas.microsoft.com/office/powerpoint/2010/main" val="3486522304"/>
+      </p:ext>
+    </p:extLst>
+  </p:cSld>
+  <p:clrMapOvr>
+    <a:masterClrMapping/>
+  </p:clrMapOvr>
+</p:sld>
+</file>
+
+<file path=ppt/slides/slide8.xml><?xml version="1.0" encoding="utf-8"?>
+<p:sld xmlns:a="http://schemas.openxmlformats.org/drawingml/2006/main" xmlns:r="http://schemas.openxmlformats.org/officeDocument/2006/relationships" xmlns:p="http://schemas.openxmlformats.org/presentationml/2006/main">
+  <p:cSld>
+    <p:spTree>
+      <p:nvGrpSpPr>
+        <p:cNvPr id="1" name=""/>
+        <p:cNvGrpSpPr/>
+        <p:nvPr/>
+      </p:nvGrpSpPr>
+      <p:grpSpPr>
+        <a:xfrm>
+          <a:off x="0" y="0"/>
+          <a:ext cx="0" cy="0"/>
+          <a:chOff x="0" y="0"/>
+          <a:chExt cx="0" cy="0"/>
+        </a:xfrm>
+      </p:grpSpPr>
+      <p:sp>
+        <p:nvSpPr>
+          <p:cNvPr id="2" name="Title 1">
+            <a:extLst>
+              <a:ext uri="{FF2B5EF4-FFF2-40B4-BE49-F238E27FC236}">
+                <a16:creationId xmlns:a16="http://schemas.microsoft.com/office/drawing/2014/main" id="{8A4E24BA-287E-5549-989A-6FDA7F6E23A7}"/>
+              </a:ext>
+            </a:extLst>
+          </p:cNvPr>
+          <p:cNvSpPr>
+            <a:spLocks noGrp="1"/>
+          </p:cNvSpPr>
+          <p:nvPr>
+            <p:ph type="title"/>
+          </p:nvPr>
+        </p:nvSpPr>
+        <p:spPr/>
+        <p:txBody>
+          <a:bodyPr>
+            <a:normAutofit/>
+          </a:bodyPr>
+          <a:lstStyle/>
+          <a:p>
+            <a:r>
+              <a:rPr lang="en-US" dirty="0"/>
+              <a:t>Some </a:t>
+            </a:r>
+            <a:r>
+              <a:rPr lang="en-US" dirty="0" err="1"/>
+              <a:t>sda</a:t>
+            </a:r>
+            <a:r>
+              <a:rPr lang="en-US" dirty="0"/>
+              <a:t> on amazon</a:t>
+            </a:r>
+            <a:br>
+              <a:rPr lang="en-US" dirty="0"/>
+            </a:br>
+            <a:r>
+              <a:rPr lang="en-US" dirty="0"/>
+              <a:t>book review data</a:t>
+            </a:r>
+          </a:p>
+        </p:txBody>
+      </p:sp>
+      <p:pic>
+        <p:nvPicPr>
+          <p:cNvPr id="5" name="Content Placeholder 4" descr="Table&#10;&#10;Description automatically generated">
+            <a:extLst>
+              <a:ext uri="{FF2B5EF4-FFF2-40B4-BE49-F238E27FC236}">
+                <a16:creationId xmlns:a16="http://schemas.microsoft.com/office/drawing/2014/main" id="{FEEB7777-70AC-CA42-8B65-3C3B73E8C2AA}"/>
+              </a:ext>
+            </a:extLst>
+          </p:cNvPr>
+          <p:cNvPicPr>
+            <a:picLocks noGrp="1" noChangeAspect="1"/>
+          </p:cNvPicPr>
+          <p:nvPr>
+            <p:ph idx="1"/>
+          </p:nvPr>
+        </p:nvPicPr>
+        <p:blipFill>
+          <a:blip r:embed="rId2"/>
+          <a:stretch>
+            <a:fillRect/>
+          </a:stretch>
+        </p:blipFill>
+        <p:spPr>
+          <a:xfrm>
+            <a:off x="1321275" y="2415207"/>
+            <a:ext cx="9549449" cy="3799855"/>
+          </a:xfrm>
+        </p:spPr>
+      </p:pic>
+    </p:spTree>
+    <p:extLst>
+      <p:ext uri="{BB962C8B-B14F-4D97-AF65-F5344CB8AC3E}">
+        <p14:creationId xmlns:p14="http://schemas.microsoft.com/office/powerpoint/2010/main" val="3939245119"/>
+      </p:ext>
+    </p:extLst>
+  </p:cSld>
+  <p:clrMapOvr>
+    <a:masterClrMapping/>
+  </p:clrMapOvr>
+</p:sld>
+</file>
+
+<file path=ppt/slides/slide9.xml><?xml version="1.0" encoding="utf-8"?>
+<p:sld xmlns:a="http://schemas.openxmlformats.org/drawingml/2006/main" xmlns:r="http://schemas.openxmlformats.org/officeDocument/2006/relationships" xmlns:p="http://schemas.openxmlformats.org/presentationml/2006/main">
+  <p:cSld>
+    <p:spTree>
+      <p:nvGrpSpPr>
+        <p:cNvPr id="1" name=""/>
+        <p:cNvGrpSpPr/>
+        <p:nvPr/>
+      </p:nvGrpSpPr>
+      <p:grpSpPr>
+        <a:xfrm>
+          <a:off x="0" y="0"/>
+          <a:ext cx="0" cy="0"/>
+          <a:chOff x="0" y="0"/>
+          <a:chExt cx="0" cy="0"/>
+        </a:xfrm>
+      </p:grpSpPr>
+      <p:sp>
+        <p:nvSpPr>
+          <p:cNvPr id="2" name="Title 1">
+            <a:extLst>
+              <a:ext uri="{FF2B5EF4-FFF2-40B4-BE49-F238E27FC236}">
+                <a16:creationId xmlns:a16="http://schemas.microsoft.com/office/drawing/2014/main" id="{B8C94C2C-C31A-3E40-BF37-8BAA5B0C6BD9}"/>
+              </a:ext>
+            </a:extLst>
+          </p:cNvPr>
+          <p:cNvSpPr>
+            <a:spLocks noGrp="1"/>
+          </p:cNvSpPr>
+          <p:nvPr>
+            <p:ph type="title"/>
+          </p:nvPr>
+        </p:nvSpPr>
+        <p:spPr/>
+        <p:txBody>
+          <a:bodyPr/>
+          <a:lstStyle/>
+          <a:p>
+            <a:r>
+              <a:rPr lang="en-US" dirty="0"/>
+              <a:t>Some </a:t>
+            </a:r>
+            <a:r>
+              <a:rPr lang="en-US" dirty="0" err="1"/>
+              <a:t>sda</a:t>
+            </a:r>
+            <a:r>
+              <a:rPr lang="en-US" dirty="0"/>
+              <a:t> on amazon </a:t>
+            </a:r>
+            <a:br>
+              <a:rPr lang="en-US" dirty="0"/>
+            </a:br>
+            <a:r>
+              <a:rPr lang="en-US" dirty="0"/>
+              <a:t>book review data</a:t>
+            </a:r>
+          </a:p>
+        </p:txBody>
+      </p:sp>
+      <p:sp>
+        <p:nvSpPr>
+          <p:cNvPr id="3" name="Content Placeholder 2">
+            <a:extLst>
+              <a:ext uri="{FF2B5EF4-FFF2-40B4-BE49-F238E27FC236}">
+                <a16:creationId xmlns:a16="http://schemas.microsoft.com/office/drawing/2014/main" id="{48946090-1E18-4743-95C2-DCFA7A238F3C}"/>
+              </a:ext>
+            </a:extLst>
+          </p:cNvPr>
+          <p:cNvSpPr>
+            <a:spLocks noGrp="1"/>
+          </p:cNvSpPr>
+          <p:nvPr>
+            <p:ph idx="1"/>
+          </p:nvPr>
+        </p:nvSpPr>
+        <p:spPr>
+          <a:xfrm>
+            <a:off x="3679825" y="2395728"/>
+            <a:ext cx="4998339" cy="433769"/>
+          </a:xfrm>
+        </p:spPr>
+        <p:txBody>
+          <a:bodyPr/>
+          <a:lstStyle/>
+          <a:p>
+            <a:r>
+              <a:rPr lang="en-US" dirty="0"/>
+              <a:t>Plot of the average star rating by date over time</a:t>
+            </a:r>
+          </a:p>
+        </p:txBody>
+      </p:sp>
+      <p:pic>
+        <p:nvPicPr>
+          <p:cNvPr id="5" name="Picture 4" descr="Chart&#10;&#10;Description automatically generated">
+            <a:extLst>
+              <a:ext uri="{FF2B5EF4-FFF2-40B4-BE49-F238E27FC236}">
+                <a16:creationId xmlns:a16="http://schemas.microsoft.com/office/drawing/2014/main" id="{1D062FD1-2CC8-874E-A84D-336A75FB7C7A}"/>
+              </a:ext>
+            </a:extLst>
+          </p:cNvPr>
+          <p:cNvPicPr>
+            <a:picLocks noChangeAspect="1"/>
+          </p:cNvPicPr>
+          <p:nvPr/>
+        </p:nvPicPr>
+        <p:blipFill>
+          <a:blip r:embed="rId2"/>
+          <a:stretch>
+            <a:fillRect/>
+          </a:stretch>
+        </p:blipFill>
+        <p:spPr>
+          <a:xfrm>
+            <a:off x="2957512" y="2829497"/>
+            <a:ext cx="6887673" cy="3531616"/>
+          </a:xfrm>
+          <a:prstGeom prst="rect">
+            <a:avLst/>
+          </a:prstGeom>
+        </p:spPr>
+      </p:pic>
+    </p:spTree>
+    <p:extLst>
+      <p:ext uri="{BB962C8B-B14F-4D97-AF65-F5344CB8AC3E}">
+        <p14:creationId xmlns:p14="http://schemas.microsoft.com/office/powerpoint/2010/main" val="1952522610"/>
       </p:ext>
     </p:extLst>
   </p:cSld>

</xml_diff>